<commit_message>
add a CGP figure for this application
</commit_message>
<xml_diff>
--- a/doc/img/flappybird.pptx
+++ b/doc/img/flappybird.pptx
@@ -6,6 +6,7 @@
   </p:sldMasterIdLst>
   <p:sldIdLst>
     <p:sldId id="256" r:id="rId2"/>
+    <p:sldId id="257" r:id="rId3"/>
   </p:sldIdLst>
   <p:sldSz cx="12192000" cy="6858000"/>
   <p:notesSz cx="6858000" cy="9144000"/>
@@ -104,6 +105,11 @@
       </a:defRPr>
     </a:lvl9pPr>
   </p:defaultTextStyle>
+  <p:extLst>
+    <p:ext uri="{EFAFB233-063F-42B5-8137-9DF3F51BA10A}">
+      <p15:sldGuideLst xmlns:p15="http://schemas.microsoft.com/office/powerpoint/2012/main"/>
+    </p:ext>
+  </p:extLst>
 </p:presentation>
 </file>
 
@@ -3321,8 +3327,8 @@
           <a:chExt cx="0" cy="0"/>
         </a:xfrm>
       </p:grpSpPr>
-      <mc:AlternateContent xmlns:mc="http://schemas.openxmlformats.org/markup-compatibility/2006">
-        <mc:Choice xmlns:a14="http://schemas.microsoft.com/office/drawing/2010/main" Requires="a14">
+      <mc:AlternateContent xmlns:mc="http://schemas.openxmlformats.org/markup-compatibility/2006" xmlns:a14="http://schemas.microsoft.com/office/drawing/2010/main">
+        <mc:Choice Requires="a14">
           <p:sp>
             <p:nvSpPr>
               <p:cNvPr id="4" name="Rectangle 3">
@@ -3399,7 +3405,7 @@
             </p:txBody>
           </p:sp>
         </mc:Choice>
-        <mc:Fallback>
+        <mc:Fallback xmlns="">
           <p:sp>
             <p:nvSpPr>
               <p:cNvPr id="4" name="Rectangle 3">
@@ -3500,8 +3506,8 @@
           </a:p>
         </p:txBody>
       </p:sp>
-      <mc:AlternateContent xmlns:mc="http://schemas.openxmlformats.org/markup-compatibility/2006">
-        <mc:Choice xmlns:a14="http://schemas.microsoft.com/office/drawing/2010/main" Requires="a14">
+      <mc:AlternateContent xmlns:mc="http://schemas.openxmlformats.org/markup-compatibility/2006" xmlns:a14="http://schemas.microsoft.com/office/drawing/2010/main">
+        <mc:Choice Requires="a14">
           <p:sp>
             <p:nvSpPr>
               <p:cNvPr id="7" name="Rectangle 6">
@@ -3566,7 +3572,7 @@
             </p:txBody>
           </p:sp>
         </mc:Choice>
-        <mc:Fallback>
+        <mc:Fallback xmlns="">
           <p:sp>
             <p:nvSpPr>
               <p:cNvPr id="7" name="Rectangle 6">
@@ -3611,8 +3617,8 @@
           </p:sp>
         </mc:Fallback>
       </mc:AlternateContent>
-      <mc:AlternateContent xmlns:mc="http://schemas.openxmlformats.org/markup-compatibility/2006">
-        <mc:Choice xmlns:a14="http://schemas.microsoft.com/office/drawing/2010/main" Requires="a14">
+      <mc:AlternateContent xmlns:mc="http://schemas.openxmlformats.org/markup-compatibility/2006" xmlns:a14="http://schemas.microsoft.com/office/drawing/2010/main">
+        <mc:Choice Requires="a14">
           <p:sp>
             <p:nvSpPr>
               <p:cNvPr id="8" name="Rectangle 7">
@@ -3684,7 +3690,7 @@
             </p:txBody>
           </p:sp>
         </mc:Choice>
-        <mc:Fallback>
+        <mc:Fallback xmlns="">
           <p:sp>
             <p:nvSpPr>
               <p:cNvPr id="8" name="Rectangle 7">
@@ -4160,8 +4166,8 @@
           </a:prstGeom>
         </p:spPr>
       </p:pic>
-      <mc:AlternateContent xmlns:mc="http://schemas.openxmlformats.org/markup-compatibility/2006">
-        <mc:Choice xmlns:a14="http://schemas.microsoft.com/office/drawing/2010/main" Requires="a14">
+      <mc:AlternateContent xmlns:mc="http://schemas.openxmlformats.org/markup-compatibility/2006" xmlns:a14="http://schemas.microsoft.com/office/drawing/2010/main">
+        <mc:Choice Requires="a14">
           <p:sp>
             <p:nvSpPr>
               <p:cNvPr id="27" name="Rectangle 26">
@@ -4238,7 +4244,7 @@
             </p:txBody>
           </p:sp>
         </mc:Choice>
-        <mc:Fallback>
+        <mc:Fallback xmlns="">
           <p:sp>
             <p:nvSpPr>
               <p:cNvPr id="27" name="Rectangle 26">
@@ -4813,6 +4819,1321 @@
     <p:extLst>
       <p:ext uri="{BB962C8B-B14F-4D97-AF65-F5344CB8AC3E}">
         <p14:creationId xmlns:p14="http://schemas.microsoft.com/office/powerpoint/2010/main" val="3193635646"/>
+      </p:ext>
+    </p:extLst>
+  </p:cSld>
+  <p:clrMapOvr>
+    <a:masterClrMapping/>
+  </p:clrMapOvr>
+</p:sld>
+</file>
+
+<file path=ppt/slides/slide2.xml><?xml version="1.0" encoding="utf-8"?>
+<p:sld xmlns:a="http://schemas.openxmlformats.org/drawingml/2006/main" xmlns:r="http://schemas.openxmlformats.org/officeDocument/2006/relationships" xmlns:p="http://schemas.openxmlformats.org/presentationml/2006/main">
+  <p:cSld>
+    <p:spTree>
+      <p:nvGrpSpPr>
+        <p:cNvPr id="1" name=""/>
+        <p:cNvGrpSpPr/>
+        <p:nvPr/>
+      </p:nvGrpSpPr>
+      <p:grpSpPr>
+        <a:xfrm>
+          <a:off x="0" y="0"/>
+          <a:ext cx="0" cy="0"/>
+          <a:chOff x="0" y="0"/>
+          <a:chExt cx="0" cy="0"/>
+        </a:xfrm>
+      </p:grpSpPr>
+      <p:sp>
+        <p:nvSpPr>
+          <p:cNvPr id="4" name="Oval 3">
+            <a:extLst>
+              <a:ext uri="{FF2B5EF4-FFF2-40B4-BE49-F238E27FC236}">
+                <a16:creationId xmlns:a16="http://schemas.microsoft.com/office/drawing/2014/main" id="{706E5BE5-3E6B-4A55-8BAB-56746FADD71F}"/>
+              </a:ext>
+            </a:extLst>
+          </p:cNvPr>
+          <p:cNvSpPr/>
+          <p:nvPr/>
+        </p:nvSpPr>
+        <p:spPr>
+          <a:xfrm>
+            <a:off x="2303382" y="2175317"/>
+            <a:ext cx="461394" cy="461394"/>
+          </a:xfrm>
+          <a:prstGeom prst="ellipse">
+            <a:avLst/>
+          </a:prstGeom>
+        </p:spPr>
+        <p:style>
+          <a:lnRef idx="2">
+            <a:schemeClr val="accent5">
+              <a:shade val="50000"/>
+            </a:schemeClr>
+          </a:lnRef>
+          <a:fillRef idx="1">
+            <a:schemeClr val="accent5"/>
+          </a:fillRef>
+          <a:effectRef idx="0">
+            <a:schemeClr val="accent5"/>
+          </a:effectRef>
+          <a:fontRef idx="minor">
+            <a:schemeClr val="lt1"/>
+          </a:fontRef>
+        </p:style>
+        <p:txBody>
+          <a:bodyPr rtlCol="0" anchor="ctr"/>
+          <a:lstStyle/>
+          <a:p>
+            <a:pPr algn="ctr"/>
+            <a:r>
+              <a:rPr lang="en-US" dirty="0"/>
+              <a:t>+</a:t>
+            </a:r>
+          </a:p>
+        </p:txBody>
+      </p:sp>
+      <p:sp>
+        <p:nvSpPr>
+          <p:cNvPr id="5" name="Oval 4">
+            <a:extLst>
+              <a:ext uri="{FF2B5EF4-FFF2-40B4-BE49-F238E27FC236}">
+                <a16:creationId xmlns:a16="http://schemas.microsoft.com/office/drawing/2014/main" id="{B4F908D1-477D-4C21-805A-745BC6AF7221}"/>
+              </a:ext>
+            </a:extLst>
+          </p:cNvPr>
+          <p:cNvSpPr/>
+          <p:nvPr/>
+        </p:nvSpPr>
+        <p:spPr>
+          <a:xfrm>
+            <a:off x="3087149" y="2175317"/>
+            <a:ext cx="461394" cy="461394"/>
+          </a:xfrm>
+          <a:prstGeom prst="ellipse">
+            <a:avLst/>
+          </a:prstGeom>
+        </p:spPr>
+        <p:style>
+          <a:lnRef idx="2">
+            <a:schemeClr val="accent5">
+              <a:shade val="50000"/>
+            </a:schemeClr>
+          </a:lnRef>
+          <a:fillRef idx="1">
+            <a:schemeClr val="accent5"/>
+          </a:fillRef>
+          <a:effectRef idx="0">
+            <a:schemeClr val="accent5"/>
+          </a:effectRef>
+          <a:fontRef idx="minor">
+            <a:schemeClr val="lt1"/>
+          </a:fontRef>
+        </p:style>
+        <p:txBody>
+          <a:bodyPr lIns="0" rIns="0" rtlCol="0" anchor="ctr"/>
+          <a:lstStyle/>
+          <a:p>
+            <a:pPr algn="ctr"/>
+            <a:r>
+              <a:rPr lang="en-US" sz="1600" dirty="0"/>
+              <a:t>neg</a:t>
+            </a:r>
+          </a:p>
+        </p:txBody>
+      </p:sp>
+      <p:sp>
+        <p:nvSpPr>
+          <p:cNvPr id="6" name="Oval 5">
+            <a:extLst>
+              <a:ext uri="{FF2B5EF4-FFF2-40B4-BE49-F238E27FC236}">
+                <a16:creationId xmlns:a16="http://schemas.microsoft.com/office/drawing/2014/main" id="{E6837CF5-7B2D-48FD-9216-46C3C27A0BDD}"/>
+              </a:ext>
+            </a:extLst>
+          </p:cNvPr>
+          <p:cNvSpPr/>
+          <p:nvPr/>
+        </p:nvSpPr>
+        <p:spPr>
+          <a:xfrm>
+            <a:off x="3892492" y="2175317"/>
+            <a:ext cx="461394" cy="461394"/>
+          </a:xfrm>
+          <a:prstGeom prst="ellipse">
+            <a:avLst/>
+          </a:prstGeom>
+        </p:spPr>
+        <p:style>
+          <a:lnRef idx="2">
+            <a:schemeClr val="accent5">
+              <a:shade val="50000"/>
+            </a:schemeClr>
+          </a:lnRef>
+          <a:fillRef idx="1">
+            <a:schemeClr val="accent5"/>
+          </a:fillRef>
+          <a:effectRef idx="0">
+            <a:schemeClr val="accent5"/>
+          </a:effectRef>
+          <a:fontRef idx="minor">
+            <a:schemeClr val="lt1"/>
+          </a:fontRef>
+        </p:style>
+        <p:txBody>
+          <a:bodyPr rtlCol="0" anchor="ctr"/>
+          <a:lstStyle/>
+          <a:p>
+            <a:pPr algn="ctr"/>
+            <a:r>
+              <a:rPr lang="en-US" dirty="0"/>
+              <a:t>-</a:t>
+            </a:r>
+          </a:p>
+        </p:txBody>
+      </p:sp>
+      <p:sp>
+        <p:nvSpPr>
+          <p:cNvPr id="7" name="Oval 6">
+            <a:extLst>
+              <a:ext uri="{FF2B5EF4-FFF2-40B4-BE49-F238E27FC236}">
+                <a16:creationId xmlns:a16="http://schemas.microsoft.com/office/drawing/2014/main" id="{88B7EC5E-3957-48DE-A9E5-27A319B4A0DE}"/>
+              </a:ext>
+            </a:extLst>
+          </p:cNvPr>
+          <p:cNvSpPr/>
+          <p:nvPr/>
+        </p:nvSpPr>
+        <p:spPr>
+          <a:xfrm>
+            <a:off x="4681057" y="2175317"/>
+            <a:ext cx="461394" cy="461394"/>
+          </a:xfrm>
+          <a:prstGeom prst="ellipse">
+            <a:avLst/>
+          </a:prstGeom>
+        </p:spPr>
+        <p:style>
+          <a:lnRef idx="2">
+            <a:schemeClr val="accent5">
+              <a:shade val="50000"/>
+            </a:schemeClr>
+          </a:lnRef>
+          <a:fillRef idx="1">
+            <a:schemeClr val="accent5"/>
+          </a:fillRef>
+          <a:effectRef idx="0">
+            <a:schemeClr val="accent5"/>
+          </a:effectRef>
+          <a:fontRef idx="minor">
+            <a:schemeClr val="lt1"/>
+          </a:fontRef>
+        </p:style>
+        <p:txBody>
+          <a:bodyPr rtlCol="0" anchor="ctr"/>
+          <a:lstStyle/>
+          <a:p>
+            <a:pPr algn="ctr"/>
+            <a:r>
+              <a:rPr lang="en-US" dirty="0"/>
+              <a:t>/</a:t>
+            </a:r>
+          </a:p>
+        </p:txBody>
+      </p:sp>
+      <mc:AlternateContent xmlns:mc="http://schemas.openxmlformats.org/markup-compatibility/2006">
+        <mc:Choice xmlns:a14="http://schemas.microsoft.com/office/drawing/2010/main" Requires="a14">
+          <p:sp>
+            <p:nvSpPr>
+              <p:cNvPr id="8" name="TextBox 7">
+                <a:extLst>
+                  <a:ext uri="{FF2B5EF4-FFF2-40B4-BE49-F238E27FC236}">
+                    <a16:creationId xmlns:a16="http://schemas.microsoft.com/office/drawing/2014/main" id="{4F865168-DDA5-46F6-96F8-BF9606609F5F}"/>
+                  </a:ext>
+                </a:extLst>
+              </p:cNvPr>
+              <p:cNvSpPr txBox="1"/>
+              <p:nvPr/>
+            </p:nvSpPr>
+            <p:spPr>
+              <a:xfrm>
+                <a:off x="5226341" y="2221348"/>
+                <a:ext cx="693490" cy="369332"/>
+              </a:xfrm>
+              <a:prstGeom prst="rect">
+                <a:avLst/>
+              </a:prstGeom>
+              <a:noFill/>
+            </p:spPr>
+            <p:txBody>
+              <a:bodyPr wrap="square" rtlCol="0">
+                <a:spAutoFit/>
+              </a:bodyPr>
+              <a:lstStyle/>
+              <a:p>
+                <a14:m>
+                  <m:oMathPara xmlns:m="http://schemas.openxmlformats.org/officeDocument/2006/math">
+                    <m:oMathParaPr>
+                      <m:jc m:val="centerGroup"/>
+                    </m:oMathParaPr>
+                    <m:oMath xmlns:m="http://schemas.openxmlformats.org/officeDocument/2006/math">
+                      <m:r>
+                        <a:rPr lang="en-US" b="0" i="1" smtClean="0">
+                          <a:latin typeface="Cambria Math" panose="02040503050406030204" pitchFamily="18" charset="0"/>
+                        </a:rPr>
+                        <m:t>⋯</m:t>
+                      </m:r>
+                    </m:oMath>
+                  </m:oMathPara>
+                </a14:m>
+                <a:endParaRPr lang="en-US" dirty="0"/>
+              </a:p>
+            </p:txBody>
+          </p:sp>
+        </mc:Choice>
+        <mc:Fallback>
+          <p:sp>
+            <p:nvSpPr>
+              <p:cNvPr id="8" name="TextBox 7">
+                <a:extLst>
+                  <a:ext uri="{FF2B5EF4-FFF2-40B4-BE49-F238E27FC236}">
+                    <a16:creationId xmlns:a16="http://schemas.microsoft.com/office/drawing/2014/main" id="{4F865168-DDA5-46F6-96F8-BF9606609F5F}"/>
+                  </a:ext>
+                </a:extLst>
+              </p:cNvPr>
+              <p:cNvSpPr txBox="1">
+                <a:spLocks noRot="1" noChangeAspect="1" noMove="1" noResize="1" noEditPoints="1" noAdjustHandles="1" noChangeArrowheads="1" noChangeShapeType="1" noTextEdit="1"/>
+              </p:cNvSpPr>
+              <p:nvPr/>
+            </p:nvSpPr>
+            <p:spPr>
+              <a:xfrm>
+                <a:off x="5226341" y="2221348"/>
+                <a:ext cx="693490" cy="369332"/>
+              </a:xfrm>
+              <a:prstGeom prst="rect">
+                <a:avLst/>
+              </a:prstGeom>
+              <a:blipFill>
+                <a:blip r:embed="rId2"/>
+                <a:stretch>
+                  <a:fillRect/>
+                </a:stretch>
+              </a:blipFill>
+            </p:spPr>
+            <p:txBody>
+              <a:bodyPr/>
+              <a:lstStyle/>
+              <a:p>
+                <a:r>
+                  <a:rPr lang="en-US">
+                    <a:noFill/>
+                  </a:rPr>
+                  <a:t> </a:t>
+                </a:r>
+              </a:p>
+            </p:txBody>
+          </p:sp>
+        </mc:Fallback>
+      </mc:AlternateContent>
+      <p:sp>
+        <p:nvSpPr>
+          <p:cNvPr id="9" name="Oval 8">
+            <a:extLst>
+              <a:ext uri="{FF2B5EF4-FFF2-40B4-BE49-F238E27FC236}">
+                <a16:creationId xmlns:a16="http://schemas.microsoft.com/office/drawing/2014/main" id="{0B9A48A9-3D17-4AB7-8636-B4C9C543FEC4}"/>
+              </a:ext>
+            </a:extLst>
+          </p:cNvPr>
+          <p:cNvSpPr/>
+          <p:nvPr/>
+        </p:nvSpPr>
+        <p:spPr>
+          <a:xfrm>
+            <a:off x="5865303" y="2175317"/>
+            <a:ext cx="461394" cy="461394"/>
+          </a:xfrm>
+          <a:prstGeom prst="ellipse">
+            <a:avLst/>
+          </a:prstGeom>
+        </p:spPr>
+        <p:style>
+          <a:lnRef idx="2">
+            <a:schemeClr val="accent5">
+              <a:shade val="50000"/>
+            </a:schemeClr>
+          </a:lnRef>
+          <a:fillRef idx="1">
+            <a:schemeClr val="accent5"/>
+          </a:fillRef>
+          <a:effectRef idx="0">
+            <a:schemeClr val="accent5"/>
+          </a:effectRef>
+          <a:fontRef idx="minor">
+            <a:schemeClr val="lt1"/>
+          </a:fontRef>
+        </p:style>
+        <p:txBody>
+          <a:bodyPr rtlCol="0" anchor="ctr"/>
+          <a:lstStyle/>
+          <a:p>
+            <a:pPr algn="ctr"/>
+            <a:r>
+              <a:rPr lang="en-US" dirty="0"/>
+              <a:t>*</a:t>
+            </a:r>
+          </a:p>
+        </p:txBody>
+      </p:sp>
+      <p:sp>
+        <p:nvSpPr>
+          <p:cNvPr id="10" name="Oval 9">
+            <a:extLst>
+              <a:ext uri="{FF2B5EF4-FFF2-40B4-BE49-F238E27FC236}">
+                <a16:creationId xmlns:a16="http://schemas.microsoft.com/office/drawing/2014/main" id="{DC9316D8-4EA1-4302-8BFB-6F0C1B43ABB4}"/>
+              </a:ext>
+            </a:extLst>
+          </p:cNvPr>
+          <p:cNvSpPr/>
+          <p:nvPr/>
+        </p:nvSpPr>
+        <p:spPr>
+          <a:xfrm>
+            <a:off x="6657364" y="2175317"/>
+            <a:ext cx="461394" cy="461394"/>
+          </a:xfrm>
+          <a:prstGeom prst="ellipse">
+            <a:avLst/>
+          </a:prstGeom>
+        </p:spPr>
+        <p:style>
+          <a:lnRef idx="2">
+            <a:schemeClr val="accent5">
+              <a:shade val="50000"/>
+            </a:schemeClr>
+          </a:lnRef>
+          <a:fillRef idx="1">
+            <a:schemeClr val="accent5"/>
+          </a:fillRef>
+          <a:effectRef idx="0">
+            <a:schemeClr val="accent5"/>
+          </a:effectRef>
+          <a:fontRef idx="minor">
+            <a:schemeClr val="lt1"/>
+          </a:fontRef>
+        </p:style>
+        <p:txBody>
+          <a:bodyPr rtlCol="0" anchor="ctr"/>
+          <a:lstStyle/>
+          <a:p>
+            <a:pPr algn="ctr"/>
+            <a:r>
+              <a:rPr lang="en-US" dirty="0"/>
+              <a:t>+</a:t>
+            </a:r>
+          </a:p>
+        </p:txBody>
+      </p:sp>
+      <p:sp>
+        <p:nvSpPr>
+          <p:cNvPr id="11" name="Oval 10">
+            <a:extLst>
+              <a:ext uri="{FF2B5EF4-FFF2-40B4-BE49-F238E27FC236}">
+                <a16:creationId xmlns:a16="http://schemas.microsoft.com/office/drawing/2014/main" id="{DABD0F34-C432-470E-B239-469A29DECE79}"/>
+              </a:ext>
+            </a:extLst>
+          </p:cNvPr>
+          <p:cNvSpPr/>
+          <p:nvPr/>
+        </p:nvSpPr>
+        <p:spPr>
+          <a:xfrm>
+            <a:off x="8002663" y="2175317"/>
+            <a:ext cx="461394" cy="461394"/>
+          </a:xfrm>
+          <a:prstGeom prst="ellipse">
+            <a:avLst/>
+          </a:prstGeom>
+        </p:spPr>
+        <p:style>
+          <a:lnRef idx="2">
+            <a:schemeClr val="accent5">
+              <a:shade val="50000"/>
+            </a:schemeClr>
+          </a:lnRef>
+          <a:fillRef idx="1">
+            <a:schemeClr val="accent5"/>
+          </a:fillRef>
+          <a:effectRef idx="0">
+            <a:schemeClr val="accent5"/>
+          </a:effectRef>
+          <a:fontRef idx="minor">
+            <a:schemeClr val="lt1"/>
+          </a:fontRef>
+        </p:style>
+        <p:txBody>
+          <a:bodyPr rtlCol="0" anchor="ctr"/>
+          <a:lstStyle/>
+          <a:p>
+            <a:pPr algn="ctr"/>
+            <a:r>
+              <a:rPr lang="en-US" dirty="0"/>
+              <a:t>-</a:t>
+            </a:r>
+          </a:p>
+        </p:txBody>
+      </p:sp>
+      <p:cxnSp>
+        <p:nvCxnSpPr>
+          <p:cNvPr id="13" name="Straight Arrow Connector 12">
+            <a:extLst>
+              <a:ext uri="{FF2B5EF4-FFF2-40B4-BE49-F238E27FC236}">
+                <a16:creationId xmlns:a16="http://schemas.microsoft.com/office/drawing/2014/main" id="{CF56A918-4C29-4F87-AE93-83F8A754213F}"/>
+              </a:ext>
+            </a:extLst>
+          </p:cNvPr>
+          <p:cNvCxnSpPr>
+            <a:cxnSpLocks/>
+          </p:cNvCxnSpPr>
+          <p:nvPr/>
+        </p:nvCxnSpPr>
+        <p:spPr>
+          <a:xfrm flipV="1">
+            <a:off x="8464057" y="2394715"/>
+            <a:ext cx="450730" cy="22598"/>
+          </a:xfrm>
+          <a:prstGeom prst="straightConnector1">
+            <a:avLst/>
+          </a:prstGeom>
+          <a:ln>
+            <a:tailEnd type="triangle"/>
+          </a:ln>
+        </p:spPr>
+        <p:style>
+          <a:lnRef idx="1">
+            <a:schemeClr val="accent1"/>
+          </a:lnRef>
+          <a:fillRef idx="0">
+            <a:schemeClr val="accent1"/>
+          </a:fillRef>
+          <a:effectRef idx="0">
+            <a:schemeClr val="accent1"/>
+          </a:effectRef>
+          <a:fontRef idx="minor">
+            <a:schemeClr val="tx1"/>
+          </a:fontRef>
+        </p:style>
+      </p:cxnSp>
+      <mc:AlternateContent xmlns:mc="http://schemas.openxmlformats.org/markup-compatibility/2006">
+        <mc:Choice xmlns:a14="http://schemas.microsoft.com/office/drawing/2010/main" Requires="a14">
+          <p:sp>
+            <p:nvSpPr>
+              <p:cNvPr id="16" name="TextBox 15">
+                <a:extLst>
+                  <a:ext uri="{FF2B5EF4-FFF2-40B4-BE49-F238E27FC236}">
+                    <a16:creationId xmlns:a16="http://schemas.microsoft.com/office/drawing/2014/main" id="{D5B13824-70F5-4B9E-9788-B5C423CA1C5F}"/>
+                  </a:ext>
+                </a:extLst>
+              </p:cNvPr>
+              <p:cNvSpPr txBox="1"/>
+              <p:nvPr/>
+            </p:nvSpPr>
+            <p:spPr>
+              <a:xfrm>
+                <a:off x="8755048" y="2221348"/>
+                <a:ext cx="684060" cy="369332"/>
+              </a:xfrm>
+              <a:prstGeom prst="rect">
+                <a:avLst/>
+              </a:prstGeom>
+              <a:noFill/>
+            </p:spPr>
+            <p:txBody>
+              <a:bodyPr wrap="square" rtlCol="0">
+                <a:spAutoFit/>
+              </a:bodyPr>
+              <a:lstStyle/>
+              <a:p>
+                <a14:m>
+                  <m:oMathPara xmlns:m="http://schemas.openxmlformats.org/officeDocument/2006/math">
+                    <m:oMathParaPr>
+                      <m:jc m:val="centerGroup"/>
+                    </m:oMathParaPr>
+                    <m:oMath xmlns:m="http://schemas.openxmlformats.org/officeDocument/2006/math">
+                      <m:r>
+                        <a:rPr lang="en-US" b="0" i="1" smtClean="0">
+                          <a:latin typeface="Cambria Math" panose="02040503050406030204" pitchFamily="18" charset="0"/>
+                        </a:rPr>
+                        <m:t>𝑦</m:t>
+                      </m:r>
+                    </m:oMath>
+                  </m:oMathPara>
+                </a14:m>
+                <a:endParaRPr lang="en-US" dirty="0"/>
+              </a:p>
+            </p:txBody>
+          </p:sp>
+        </mc:Choice>
+        <mc:Fallback>
+          <p:sp>
+            <p:nvSpPr>
+              <p:cNvPr id="16" name="TextBox 15">
+                <a:extLst>
+                  <a:ext uri="{FF2B5EF4-FFF2-40B4-BE49-F238E27FC236}">
+                    <a16:creationId xmlns:a16="http://schemas.microsoft.com/office/drawing/2014/main" id="{D5B13824-70F5-4B9E-9788-B5C423CA1C5F}"/>
+                  </a:ext>
+                </a:extLst>
+              </p:cNvPr>
+              <p:cNvSpPr txBox="1">
+                <a:spLocks noRot="1" noChangeAspect="1" noMove="1" noResize="1" noEditPoints="1" noAdjustHandles="1" noChangeArrowheads="1" noChangeShapeType="1" noTextEdit="1"/>
+              </p:cNvSpPr>
+              <p:nvPr/>
+            </p:nvSpPr>
+            <p:spPr>
+              <a:xfrm>
+                <a:off x="8755048" y="2221348"/>
+                <a:ext cx="684060" cy="369332"/>
+              </a:xfrm>
+              <a:prstGeom prst="rect">
+                <a:avLst/>
+              </a:prstGeom>
+              <a:blipFill>
+                <a:blip r:embed="rId3"/>
+                <a:stretch>
+                  <a:fillRect b="-6557"/>
+                </a:stretch>
+              </a:blipFill>
+            </p:spPr>
+            <p:txBody>
+              <a:bodyPr/>
+              <a:lstStyle/>
+              <a:p>
+                <a:r>
+                  <a:rPr lang="en-US">
+                    <a:noFill/>
+                  </a:rPr>
+                  <a:t> </a:t>
+                </a:r>
+              </a:p>
+            </p:txBody>
+          </p:sp>
+        </mc:Fallback>
+      </mc:AlternateContent>
+      <p:sp>
+        <p:nvSpPr>
+          <p:cNvPr id="17" name="Rectangle 16">
+            <a:extLst>
+              <a:ext uri="{FF2B5EF4-FFF2-40B4-BE49-F238E27FC236}">
+                <a16:creationId xmlns:a16="http://schemas.microsoft.com/office/drawing/2014/main" id="{EAA43554-E917-4191-BB4A-6FC132935EC4}"/>
+              </a:ext>
+            </a:extLst>
+          </p:cNvPr>
+          <p:cNvSpPr/>
+          <p:nvPr/>
+        </p:nvSpPr>
+        <p:spPr>
+          <a:xfrm>
+            <a:off x="1679510" y="1828798"/>
+            <a:ext cx="270588" cy="267935"/>
+          </a:xfrm>
+          <a:prstGeom prst="rect">
+            <a:avLst/>
+          </a:prstGeom>
+        </p:spPr>
+        <p:style>
+          <a:lnRef idx="2">
+            <a:schemeClr val="accent6">
+              <a:shade val="50000"/>
+            </a:schemeClr>
+          </a:lnRef>
+          <a:fillRef idx="1">
+            <a:schemeClr val="accent6"/>
+          </a:fillRef>
+          <a:effectRef idx="0">
+            <a:schemeClr val="accent6"/>
+          </a:effectRef>
+          <a:fontRef idx="minor">
+            <a:schemeClr val="lt1"/>
+          </a:fontRef>
+        </p:style>
+        <p:txBody>
+          <a:bodyPr rtlCol="0" anchor="ctr"/>
+          <a:lstStyle/>
+          <a:p>
+            <a:pPr algn="ctr"/>
+            <a:r>
+              <a:rPr lang="en-US" dirty="0"/>
+              <a:t>h</a:t>
+            </a:r>
+          </a:p>
+        </p:txBody>
+      </p:sp>
+      <p:sp>
+        <p:nvSpPr>
+          <p:cNvPr id="18" name="Rectangle 17">
+            <a:extLst>
+              <a:ext uri="{FF2B5EF4-FFF2-40B4-BE49-F238E27FC236}">
+                <a16:creationId xmlns:a16="http://schemas.microsoft.com/office/drawing/2014/main" id="{0D57C101-782E-41C4-9F78-3698B8FD7260}"/>
+              </a:ext>
+            </a:extLst>
+          </p:cNvPr>
+          <p:cNvSpPr/>
+          <p:nvPr/>
+        </p:nvSpPr>
+        <p:spPr>
+          <a:xfrm>
+            <a:off x="1679510" y="2272047"/>
+            <a:ext cx="270588" cy="267935"/>
+          </a:xfrm>
+          <a:prstGeom prst="rect">
+            <a:avLst/>
+          </a:prstGeom>
+        </p:spPr>
+        <p:style>
+          <a:lnRef idx="2">
+            <a:schemeClr val="accent6">
+              <a:shade val="50000"/>
+            </a:schemeClr>
+          </a:lnRef>
+          <a:fillRef idx="1">
+            <a:schemeClr val="accent6"/>
+          </a:fillRef>
+          <a:effectRef idx="0">
+            <a:schemeClr val="accent6"/>
+          </a:effectRef>
+          <a:fontRef idx="minor">
+            <a:schemeClr val="lt1"/>
+          </a:fontRef>
+        </p:style>
+        <p:txBody>
+          <a:bodyPr rtlCol="0" anchor="ctr"/>
+          <a:lstStyle/>
+          <a:p>
+            <a:pPr algn="ctr"/>
+            <a:r>
+              <a:rPr lang="en-US" dirty="0"/>
+              <a:t>v</a:t>
+            </a:r>
+          </a:p>
+        </p:txBody>
+      </p:sp>
+      <p:sp>
+        <p:nvSpPr>
+          <p:cNvPr id="19" name="Rectangle 18">
+            <a:extLst>
+              <a:ext uri="{FF2B5EF4-FFF2-40B4-BE49-F238E27FC236}">
+                <a16:creationId xmlns:a16="http://schemas.microsoft.com/office/drawing/2014/main" id="{52DA6E8A-D195-4539-BD15-8DB7CE422FB1}"/>
+              </a:ext>
+            </a:extLst>
+          </p:cNvPr>
+          <p:cNvSpPr/>
+          <p:nvPr/>
+        </p:nvSpPr>
+        <p:spPr>
+          <a:xfrm>
+            <a:off x="1679510" y="2773928"/>
+            <a:ext cx="270588" cy="267935"/>
+          </a:xfrm>
+          <a:prstGeom prst="rect">
+            <a:avLst/>
+          </a:prstGeom>
+        </p:spPr>
+        <p:style>
+          <a:lnRef idx="2">
+            <a:schemeClr val="accent6">
+              <a:shade val="50000"/>
+            </a:schemeClr>
+          </a:lnRef>
+          <a:fillRef idx="1">
+            <a:schemeClr val="accent6"/>
+          </a:fillRef>
+          <a:effectRef idx="0">
+            <a:schemeClr val="accent6"/>
+          </a:effectRef>
+          <a:fontRef idx="minor">
+            <a:schemeClr val="lt1"/>
+          </a:fontRef>
+        </p:style>
+        <p:txBody>
+          <a:bodyPr rtlCol="0" anchor="ctr"/>
+          <a:lstStyle/>
+          <a:p>
+            <a:pPr algn="ctr"/>
+            <a:r>
+              <a:rPr lang="en-US" dirty="0"/>
+              <a:t>g</a:t>
+            </a:r>
+          </a:p>
+        </p:txBody>
+      </p:sp>
+      <p:cxnSp>
+        <p:nvCxnSpPr>
+          <p:cNvPr id="23" name="Connector: Curved 22">
+            <a:extLst>
+              <a:ext uri="{FF2B5EF4-FFF2-40B4-BE49-F238E27FC236}">
+                <a16:creationId xmlns:a16="http://schemas.microsoft.com/office/drawing/2014/main" id="{E4AE8D96-C292-48EB-9232-C16CFAB35228}"/>
+              </a:ext>
+            </a:extLst>
+          </p:cNvPr>
+          <p:cNvCxnSpPr>
+            <a:stCxn id="18" idx="3"/>
+            <a:endCxn id="4" idx="2"/>
+          </p:cNvCxnSpPr>
+          <p:nvPr/>
+        </p:nvCxnSpPr>
+        <p:spPr>
+          <a:xfrm flipV="1">
+            <a:off x="1950098" y="2406014"/>
+            <a:ext cx="353284" cy="1"/>
+          </a:xfrm>
+          <a:prstGeom prst="curvedConnector3">
+            <a:avLst/>
+          </a:prstGeom>
+          <a:ln>
+            <a:tailEnd type="triangle"/>
+          </a:ln>
+        </p:spPr>
+        <p:style>
+          <a:lnRef idx="1">
+            <a:schemeClr val="accent1"/>
+          </a:lnRef>
+          <a:fillRef idx="0">
+            <a:schemeClr val="accent1"/>
+          </a:fillRef>
+          <a:effectRef idx="0">
+            <a:schemeClr val="accent1"/>
+          </a:effectRef>
+          <a:fontRef idx="minor">
+            <a:schemeClr val="tx1"/>
+          </a:fontRef>
+        </p:style>
+      </p:cxnSp>
+      <p:cxnSp>
+        <p:nvCxnSpPr>
+          <p:cNvPr id="25" name="Connector: Curved 24">
+            <a:extLst>
+              <a:ext uri="{FF2B5EF4-FFF2-40B4-BE49-F238E27FC236}">
+                <a16:creationId xmlns:a16="http://schemas.microsoft.com/office/drawing/2014/main" id="{C9B39962-0AC7-4E97-AE09-6F39BC4736EF}"/>
+              </a:ext>
+            </a:extLst>
+          </p:cNvPr>
+          <p:cNvCxnSpPr>
+            <a:cxnSpLocks/>
+            <a:stCxn id="17" idx="3"/>
+            <a:endCxn id="4" idx="0"/>
+          </p:cNvCxnSpPr>
+          <p:nvPr/>
+        </p:nvCxnSpPr>
+        <p:spPr>
+          <a:xfrm>
+            <a:off x="1950098" y="1962766"/>
+            <a:ext cx="583981" cy="212551"/>
+          </a:xfrm>
+          <a:prstGeom prst="curvedConnector2">
+            <a:avLst/>
+          </a:prstGeom>
+          <a:ln>
+            <a:tailEnd type="triangle"/>
+          </a:ln>
+        </p:spPr>
+        <p:style>
+          <a:lnRef idx="1">
+            <a:schemeClr val="accent1"/>
+          </a:lnRef>
+          <a:fillRef idx="0">
+            <a:schemeClr val="accent1"/>
+          </a:fillRef>
+          <a:effectRef idx="0">
+            <a:schemeClr val="accent1"/>
+          </a:effectRef>
+          <a:fontRef idx="minor">
+            <a:schemeClr val="tx1"/>
+          </a:fontRef>
+        </p:style>
+      </p:cxnSp>
+      <p:cxnSp>
+        <p:nvCxnSpPr>
+          <p:cNvPr id="27" name="Straight Arrow Connector 26">
+            <a:extLst>
+              <a:ext uri="{FF2B5EF4-FFF2-40B4-BE49-F238E27FC236}">
+                <a16:creationId xmlns:a16="http://schemas.microsoft.com/office/drawing/2014/main" id="{6FD48A63-DEBA-43C1-BDD5-1532DC4EDB28}"/>
+              </a:ext>
+            </a:extLst>
+          </p:cNvPr>
+          <p:cNvCxnSpPr>
+            <a:cxnSpLocks/>
+            <a:stCxn id="4" idx="6"/>
+            <a:endCxn id="5" idx="2"/>
+          </p:cNvCxnSpPr>
+          <p:nvPr/>
+        </p:nvCxnSpPr>
+        <p:spPr>
+          <a:xfrm>
+            <a:off x="2764776" y="2406014"/>
+            <a:ext cx="322373" cy="0"/>
+          </a:xfrm>
+          <a:prstGeom prst="straightConnector1">
+            <a:avLst/>
+          </a:prstGeom>
+          <a:ln>
+            <a:tailEnd type="triangle"/>
+          </a:ln>
+        </p:spPr>
+        <p:style>
+          <a:lnRef idx="1">
+            <a:schemeClr val="accent1"/>
+          </a:lnRef>
+          <a:fillRef idx="0">
+            <a:schemeClr val="accent1"/>
+          </a:fillRef>
+          <a:effectRef idx="0">
+            <a:schemeClr val="accent1"/>
+          </a:effectRef>
+          <a:fontRef idx="minor">
+            <a:schemeClr val="tx1"/>
+          </a:fontRef>
+        </p:style>
+      </p:cxnSp>
+      <p:cxnSp>
+        <p:nvCxnSpPr>
+          <p:cNvPr id="29" name="Connector: Curved 28">
+            <a:extLst>
+              <a:ext uri="{FF2B5EF4-FFF2-40B4-BE49-F238E27FC236}">
+                <a16:creationId xmlns:a16="http://schemas.microsoft.com/office/drawing/2014/main" id="{1912EC52-D130-4844-A865-1D5E83C8197A}"/>
+              </a:ext>
+            </a:extLst>
+          </p:cNvPr>
+          <p:cNvCxnSpPr>
+            <a:stCxn id="19" idx="3"/>
+            <a:endCxn id="6" idx="3"/>
+          </p:cNvCxnSpPr>
+          <p:nvPr/>
+        </p:nvCxnSpPr>
+        <p:spPr>
+          <a:xfrm flipV="1">
+            <a:off x="1950098" y="2569141"/>
+            <a:ext cx="2009964" cy="338755"/>
+          </a:xfrm>
+          <a:prstGeom prst="curvedConnector2">
+            <a:avLst/>
+          </a:prstGeom>
+          <a:ln>
+            <a:tailEnd type="triangle"/>
+          </a:ln>
+        </p:spPr>
+        <p:style>
+          <a:lnRef idx="1">
+            <a:schemeClr val="accent1"/>
+          </a:lnRef>
+          <a:fillRef idx="0">
+            <a:schemeClr val="accent1"/>
+          </a:fillRef>
+          <a:effectRef idx="0">
+            <a:schemeClr val="accent1"/>
+          </a:effectRef>
+          <a:fontRef idx="minor">
+            <a:schemeClr val="tx1"/>
+          </a:fontRef>
+        </p:style>
+      </p:cxnSp>
+      <p:cxnSp>
+        <p:nvCxnSpPr>
+          <p:cNvPr id="31" name="Connector: Curved 30">
+            <a:extLst>
+              <a:ext uri="{FF2B5EF4-FFF2-40B4-BE49-F238E27FC236}">
+                <a16:creationId xmlns:a16="http://schemas.microsoft.com/office/drawing/2014/main" id="{8D3A8D68-0E94-4358-BE92-FB91CEFA93E5}"/>
+              </a:ext>
+            </a:extLst>
+          </p:cNvPr>
+          <p:cNvCxnSpPr>
+            <a:stCxn id="19" idx="3"/>
+            <a:endCxn id="7" idx="3"/>
+          </p:cNvCxnSpPr>
+          <p:nvPr/>
+        </p:nvCxnSpPr>
+        <p:spPr>
+          <a:xfrm flipV="1">
+            <a:off x="1950098" y="2569141"/>
+            <a:ext cx="2798529" cy="338755"/>
+          </a:xfrm>
+          <a:prstGeom prst="curvedConnector2">
+            <a:avLst/>
+          </a:prstGeom>
+          <a:ln>
+            <a:tailEnd type="triangle"/>
+          </a:ln>
+        </p:spPr>
+        <p:style>
+          <a:lnRef idx="1">
+            <a:schemeClr val="accent1"/>
+          </a:lnRef>
+          <a:fillRef idx="0">
+            <a:schemeClr val="accent1"/>
+          </a:fillRef>
+          <a:effectRef idx="0">
+            <a:schemeClr val="accent1"/>
+          </a:effectRef>
+          <a:fontRef idx="minor">
+            <a:schemeClr val="tx1"/>
+          </a:fontRef>
+        </p:style>
+      </p:cxnSp>
+      <p:cxnSp>
+        <p:nvCxnSpPr>
+          <p:cNvPr id="33" name="Connector: Curved 32">
+            <a:extLst>
+              <a:ext uri="{FF2B5EF4-FFF2-40B4-BE49-F238E27FC236}">
+                <a16:creationId xmlns:a16="http://schemas.microsoft.com/office/drawing/2014/main" id="{9C1C30AA-59CC-4067-B9C6-AA56FA810FB1}"/>
+              </a:ext>
+            </a:extLst>
+          </p:cNvPr>
+          <p:cNvCxnSpPr>
+            <a:stCxn id="5" idx="6"/>
+            <a:endCxn id="7" idx="0"/>
+          </p:cNvCxnSpPr>
+          <p:nvPr/>
+        </p:nvCxnSpPr>
+        <p:spPr>
+          <a:xfrm flipV="1">
+            <a:off x="3548543" y="2175317"/>
+            <a:ext cx="1363211" cy="230697"/>
+          </a:xfrm>
+          <a:prstGeom prst="curvedConnector4">
+            <a:avLst>
+              <a:gd name="adj1" fmla="val 18951"/>
+              <a:gd name="adj2" fmla="val 199091"/>
+            </a:avLst>
+          </a:prstGeom>
+          <a:ln>
+            <a:tailEnd type="triangle"/>
+          </a:ln>
+        </p:spPr>
+        <p:style>
+          <a:lnRef idx="1">
+            <a:schemeClr val="accent1"/>
+          </a:lnRef>
+          <a:fillRef idx="0">
+            <a:schemeClr val="accent1"/>
+          </a:fillRef>
+          <a:effectRef idx="0">
+            <a:schemeClr val="accent1"/>
+          </a:effectRef>
+          <a:fontRef idx="minor">
+            <a:schemeClr val="tx1"/>
+          </a:fontRef>
+        </p:style>
+      </p:cxnSp>
+      <p:cxnSp>
+        <p:nvCxnSpPr>
+          <p:cNvPr id="36" name="Straight Arrow Connector 35">
+            <a:extLst>
+              <a:ext uri="{FF2B5EF4-FFF2-40B4-BE49-F238E27FC236}">
+                <a16:creationId xmlns:a16="http://schemas.microsoft.com/office/drawing/2014/main" id="{EEF329E4-5398-4C30-A21D-6E7035363A51}"/>
+              </a:ext>
+            </a:extLst>
+          </p:cNvPr>
+          <p:cNvCxnSpPr>
+            <a:stCxn id="8" idx="1"/>
+          </p:cNvCxnSpPr>
+          <p:nvPr/>
+        </p:nvCxnSpPr>
+        <p:spPr>
+          <a:xfrm>
+            <a:off x="5226341" y="2406014"/>
+            <a:ext cx="260059" cy="0"/>
+          </a:xfrm>
+          <a:prstGeom prst="straightConnector1">
+            <a:avLst/>
+          </a:prstGeom>
+          <a:ln>
+            <a:tailEnd type="triangle"/>
+          </a:ln>
+        </p:spPr>
+        <p:style>
+          <a:lnRef idx="1">
+            <a:schemeClr val="accent1"/>
+          </a:lnRef>
+          <a:fillRef idx="0">
+            <a:schemeClr val="accent1"/>
+          </a:fillRef>
+          <a:effectRef idx="0">
+            <a:schemeClr val="accent1"/>
+          </a:effectRef>
+          <a:fontRef idx="minor">
+            <a:schemeClr val="tx1"/>
+          </a:fontRef>
+        </p:style>
+      </p:cxnSp>
+      <p:cxnSp>
+        <p:nvCxnSpPr>
+          <p:cNvPr id="55" name="Connector: Curved 54">
+            <a:extLst>
+              <a:ext uri="{FF2B5EF4-FFF2-40B4-BE49-F238E27FC236}">
+                <a16:creationId xmlns:a16="http://schemas.microsoft.com/office/drawing/2014/main" id="{5AF84985-E908-4FF3-BDF8-F91257ECF831}"/>
+              </a:ext>
+            </a:extLst>
+          </p:cNvPr>
+          <p:cNvCxnSpPr>
+            <a:stCxn id="17" idx="3"/>
+            <a:endCxn id="6" idx="0"/>
+          </p:cNvCxnSpPr>
+          <p:nvPr/>
+        </p:nvCxnSpPr>
+        <p:spPr>
+          <a:xfrm>
+            <a:off x="1950098" y="1962766"/>
+            <a:ext cx="2173091" cy="212551"/>
+          </a:xfrm>
+          <a:prstGeom prst="curvedConnector2">
+            <a:avLst/>
+          </a:prstGeom>
+          <a:ln>
+            <a:tailEnd type="triangle"/>
+          </a:ln>
+        </p:spPr>
+        <p:style>
+          <a:lnRef idx="1">
+            <a:schemeClr val="accent1"/>
+          </a:lnRef>
+          <a:fillRef idx="0">
+            <a:schemeClr val="accent1"/>
+          </a:fillRef>
+          <a:effectRef idx="0">
+            <a:schemeClr val="accent1"/>
+          </a:effectRef>
+          <a:fontRef idx="minor">
+            <a:schemeClr val="tx1"/>
+          </a:fontRef>
+        </p:style>
+      </p:cxnSp>
+      <p:sp>
+        <p:nvSpPr>
+          <p:cNvPr id="56" name="Oval 55">
+            <a:extLst>
+              <a:ext uri="{FF2B5EF4-FFF2-40B4-BE49-F238E27FC236}">
+                <a16:creationId xmlns:a16="http://schemas.microsoft.com/office/drawing/2014/main" id="{D97EA437-4DDB-4285-8AC4-7ACA9CDA9301}"/>
+              </a:ext>
+            </a:extLst>
+          </p:cNvPr>
+          <p:cNvSpPr/>
+          <p:nvPr/>
+        </p:nvSpPr>
+        <p:spPr>
+          <a:xfrm>
+            <a:off x="7330013" y="2186616"/>
+            <a:ext cx="461394" cy="461394"/>
+          </a:xfrm>
+          <a:prstGeom prst="ellipse">
+            <a:avLst/>
+          </a:prstGeom>
+        </p:spPr>
+        <p:style>
+          <a:lnRef idx="2">
+            <a:schemeClr val="accent5">
+              <a:shade val="50000"/>
+            </a:schemeClr>
+          </a:lnRef>
+          <a:fillRef idx="1">
+            <a:schemeClr val="accent5"/>
+          </a:fillRef>
+          <a:effectRef idx="0">
+            <a:schemeClr val="accent5"/>
+          </a:effectRef>
+          <a:fontRef idx="minor">
+            <a:schemeClr val="lt1"/>
+          </a:fontRef>
+        </p:style>
+        <p:txBody>
+          <a:bodyPr rtlCol="0" anchor="ctr"/>
+          <a:lstStyle/>
+          <a:p>
+            <a:pPr algn="ctr"/>
+            <a:r>
+              <a:rPr lang="en-US" dirty="0"/>
+              <a:t>+</a:t>
+            </a:r>
+          </a:p>
+        </p:txBody>
+      </p:sp>
+      <p:cxnSp>
+        <p:nvCxnSpPr>
+          <p:cNvPr id="58" name="Connector: Curved 57">
+            <a:extLst>
+              <a:ext uri="{FF2B5EF4-FFF2-40B4-BE49-F238E27FC236}">
+                <a16:creationId xmlns:a16="http://schemas.microsoft.com/office/drawing/2014/main" id="{9F70CC91-C642-442A-BA52-B217CFAEB53F}"/>
+              </a:ext>
+            </a:extLst>
+          </p:cNvPr>
+          <p:cNvCxnSpPr>
+            <a:stCxn id="9" idx="6"/>
+            <a:endCxn id="10" idx="2"/>
+          </p:cNvCxnSpPr>
+          <p:nvPr/>
+        </p:nvCxnSpPr>
+        <p:spPr>
+          <a:xfrm>
+            <a:off x="6326697" y="2406014"/>
+            <a:ext cx="330667" cy="12700"/>
+          </a:xfrm>
+          <a:prstGeom prst="curvedConnector3">
+            <a:avLst/>
+          </a:prstGeom>
+          <a:ln>
+            <a:tailEnd type="triangle"/>
+          </a:ln>
+        </p:spPr>
+        <p:style>
+          <a:lnRef idx="1">
+            <a:schemeClr val="accent1"/>
+          </a:lnRef>
+          <a:fillRef idx="0">
+            <a:schemeClr val="accent1"/>
+          </a:fillRef>
+          <a:effectRef idx="0">
+            <a:schemeClr val="accent1"/>
+          </a:effectRef>
+          <a:fontRef idx="minor">
+            <a:schemeClr val="tx1"/>
+          </a:fontRef>
+        </p:style>
+      </p:cxnSp>
+      <p:cxnSp>
+        <p:nvCxnSpPr>
+          <p:cNvPr id="60" name="Connector: Curved 59">
+            <a:extLst>
+              <a:ext uri="{FF2B5EF4-FFF2-40B4-BE49-F238E27FC236}">
+                <a16:creationId xmlns:a16="http://schemas.microsoft.com/office/drawing/2014/main" id="{B23BB742-9876-408E-BCF4-ED0C5FDFA51C}"/>
+              </a:ext>
+            </a:extLst>
+          </p:cNvPr>
+          <p:cNvCxnSpPr>
+            <a:cxnSpLocks/>
+            <a:stCxn id="7" idx="6"/>
+            <a:endCxn id="10" idx="3"/>
+          </p:cNvCxnSpPr>
+          <p:nvPr/>
+        </p:nvCxnSpPr>
+        <p:spPr>
+          <a:xfrm>
+            <a:off x="5142451" y="2406014"/>
+            <a:ext cx="1582483" cy="163127"/>
+          </a:xfrm>
+          <a:prstGeom prst="curvedConnector4">
+            <a:avLst>
+              <a:gd name="adj1" fmla="val 3054"/>
+              <a:gd name="adj2" fmla="val 182938"/>
+            </a:avLst>
+          </a:prstGeom>
+          <a:ln>
+            <a:tailEnd type="triangle"/>
+          </a:ln>
+        </p:spPr>
+        <p:style>
+          <a:lnRef idx="1">
+            <a:schemeClr val="accent1"/>
+          </a:lnRef>
+          <a:fillRef idx="0">
+            <a:schemeClr val="accent1"/>
+          </a:fillRef>
+          <a:effectRef idx="0">
+            <a:schemeClr val="accent1"/>
+          </a:effectRef>
+          <a:fontRef idx="minor">
+            <a:schemeClr val="tx1"/>
+          </a:fontRef>
+        </p:style>
+      </p:cxnSp>
+      <p:cxnSp>
+        <p:nvCxnSpPr>
+          <p:cNvPr id="62" name="Connector: Curved 61">
+            <a:extLst>
+              <a:ext uri="{FF2B5EF4-FFF2-40B4-BE49-F238E27FC236}">
+                <a16:creationId xmlns:a16="http://schemas.microsoft.com/office/drawing/2014/main" id="{98E872C6-1C88-4390-813C-E55B02A545BD}"/>
+              </a:ext>
+            </a:extLst>
+          </p:cNvPr>
+          <p:cNvCxnSpPr>
+            <a:stCxn id="10" idx="6"/>
+            <a:endCxn id="11" idx="0"/>
+          </p:cNvCxnSpPr>
+          <p:nvPr/>
+        </p:nvCxnSpPr>
+        <p:spPr>
+          <a:xfrm flipV="1">
+            <a:off x="7118758" y="2175317"/>
+            <a:ext cx="1114602" cy="230697"/>
+          </a:xfrm>
+          <a:prstGeom prst="curvedConnector4">
+            <a:avLst>
+              <a:gd name="adj1" fmla="val 12863"/>
+              <a:gd name="adj2" fmla="val 199091"/>
+            </a:avLst>
+          </a:prstGeom>
+          <a:ln>
+            <a:tailEnd type="triangle"/>
+          </a:ln>
+        </p:spPr>
+        <p:style>
+          <a:lnRef idx="1">
+            <a:schemeClr val="accent1"/>
+          </a:lnRef>
+          <a:fillRef idx="0">
+            <a:schemeClr val="accent1"/>
+          </a:fillRef>
+          <a:effectRef idx="0">
+            <a:schemeClr val="accent1"/>
+          </a:effectRef>
+          <a:fontRef idx="minor">
+            <a:schemeClr val="tx1"/>
+          </a:fontRef>
+        </p:style>
+      </p:cxnSp>
+      <p:cxnSp>
+        <p:nvCxnSpPr>
+          <p:cNvPr id="70" name="Connector: Curved 69">
+            <a:extLst>
+              <a:ext uri="{FF2B5EF4-FFF2-40B4-BE49-F238E27FC236}">
+                <a16:creationId xmlns:a16="http://schemas.microsoft.com/office/drawing/2014/main" id="{9CF62B41-A423-4016-8537-2C4A90490DEE}"/>
+              </a:ext>
+            </a:extLst>
+          </p:cNvPr>
+          <p:cNvCxnSpPr>
+            <a:stCxn id="19" idx="3"/>
+            <a:endCxn id="11" idx="4"/>
+          </p:cNvCxnSpPr>
+          <p:nvPr/>
+        </p:nvCxnSpPr>
+        <p:spPr>
+          <a:xfrm flipV="1">
+            <a:off x="1950098" y="2636711"/>
+            <a:ext cx="6283262" cy="271185"/>
+          </a:xfrm>
+          <a:prstGeom prst="curvedConnector2">
+            <a:avLst/>
+          </a:prstGeom>
+          <a:ln>
+            <a:tailEnd type="triangle"/>
+          </a:ln>
+        </p:spPr>
+        <p:style>
+          <a:lnRef idx="1">
+            <a:schemeClr val="accent1"/>
+          </a:lnRef>
+          <a:fillRef idx="0">
+            <a:schemeClr val="accent1"/>
+          </a:fillRef>
+          <a:effectRef idx="0">
+            <a:schemeClr val="accent1"/>
+          </a:effectRef>
+          <a:fontRef idx="minor">
+            <a:schemeClr val="tx1"/>
+          </a:fontRef>
+        </p:style>
+      </p:cxnSp>
+    </p:spTree>
+    <p:extLst>
+      <p:ext uri="{BB962C8B-B14F-4D97-AF65-F5344CB8AC3E}">
+        <p14:creationId xmlns:p14="http://schemas.microsoft.com/office/powerpoint/2010/main" val="1892984425"/>
       </p:ext>
     </p:extLst>
   </p:cSld>

</xml_diff>